<commit_message>
Update: De Modifica Documento
</commit_message>
<xml_diff>
--- a/1- Analisis/1- Presentación/Presentación_Componente_Metodologico.pptx
+++ b/1- Analisis/1- Presentación/Presentación_Componente_Metodologico.pptx
@@ -22098,7 +22098,7 @@
         <p:push dir="r"/>
       </p:transition>
     </mc:Choice>
-    <mc:Fallback xmlns="" xmlns:mv="urn:schemas-microsoft-com:mac:vml" xmlns:c="http://schemas.openxmlformats.org/drawingml/2006/chart" xmlns:dgm="http://schemas.openxmlformats.org/drawingml/2006/diagram" xmlns:o="urn:schemas-microsoft-com:office:office" xmlns:v="urn:schemas-microsoft-com:vml" xmlns:pvml="urn:schemas-microsoft-com:office:powerpoint" xmlns:com="http://schemas.openxmlformats.org/drawingml/2006/compatibility" xmlns:p15="http://schemas.microsoft.com/office/powerpoint/2012/main">
+    <mc:Fallback xmlns:p15="http://schemas.microsoft.com/office/powerpoint/2012/main" xmlns:com="http://schemas.openxmlformats.org/drawingml/2006/compatibility" xmlns:pvml="urn:schemas-microsoft-com:office:powerpoint" xmlns:v="urn:schemas-microsoft-com:vml" xmlns:o="urn:schemas-microsoft-com:office:office" xmlns:dgm="http://schemas.openxmlformats.org/drawingml/2006/diagram" xmlns:c="http://schemas.openxmlformats.org/drawingml/2006/chart" xmlns:mv="urn:schemas-microsoft-com:mac:vml" xmlns="">
       <p:transition spd="slow">
         <p:fade/>
       </p:transition>
@@ -23657,7 +23657,7 @@
         <p:push dir="r"/>
       </p:transition>
     </mc:Choice>
-    <mc:Fallback xmlns="" xmlns:mv="urn:schemas-microsoft-com:mac:vml" xmlns:c="http://schemas.openxmlformats.org/drawingml/2006/chart" xmlns:dgm="http://schemas.openxmlformats.org/drawingml/2006/diagram" xmlns:o="urn:schemas-microsoft-com:office:office" xmlns:v="urn:schemas-microsoft-com:vml" xmlns:pvml="urn:schemas-microsoft-com:office:powerpoint" xmlns:com="http://schemas.openxmlformats.org/drawingml/2006/compatibility" xmlns:p15="http://schemas.microsoft.com/office/powerpoint/2012/main">
+    <mc:Fallback xmlns:p15="http://schemas.microsoft.com/office/powerpoint/2012/main" xmlns:com="http://schemas.openxmlformats.org/drawingml/2006/compatibility" xmlns:pvml="urn:schemas-microsoft-com:office:powerpoint" xmlns:v="urn:schemas-microsoft-com:vml" xmlns:o="urn:schemas-microsoft-com:office:office" xmlns:dgm="http://schemas.openxmlformats.org/drawingml/2006/diagram" xmlns:c="http://schemas.openxmlformats.org/drawingml/2006/chart" xmlns:mv="urn:schemas-microsoft-com:mac:vml" xmlns="">
       <p:transition spd="slow">
         <p:fade/>
       </p:transition>
@@ -24444,7 +24444,7 @@
                 <a:cs typeface="Calibri"/>
                 <a:sym typeface="Calibri"/>
               </a:rPr>
-              <a:t>Proyecto </a:t>
+              <a:t>Proyecto  	</a:t>
             </a:r>
             <a:endParaRPr sz="1400" b="0" i="0" u="none" strike="noStrike" cap="none">
               <a:solidFill>
@@ -24520,7 +24520,7 @@
               <a:t>Trimestre </a:t>
             </a:r>
             <a:r>
-              <a:rPr lang="es-CO" sz="3000" b="1" dirty="0">
+              <a:rPr lang="es-CO" sz="3000" b="1" i="0" u="none" strike="noStrike" cap="none" dirty="0">
                 <a:solidFill>
                   <a:srgbClr val="31859B"/>
                 </a:solidFill>
@@ -24532,7 +24532,7 @@
               <a:t>I</a:t>
             </a:r>
             <a:r>
-              <a:rPr lang="es" sz="3000" b="1" i="0" u="none" strike="noStrike" cap="none">
+              <a:rPr lang="es" sz="3000" b="1" i="0" u="none" strike="noStrike" cap="none" dirty="0">
                 <a:solidFill>
                   <a:srgbClr val="31859B"/>
                 </a:solidFill>
@@ -24544,7 +24544,7 @@
               <a:t>| </a:t>
             </a:r>
             <a:r>
-              <a:rPr lang="es" sz="3000" b="1">
+              <a:rPr lang="es" sz="3000" b="1" dirty="0">
                 <a:solidFill>
                   <a:srgbClr val="31859B"/>
                 </a:solidFill>
@@ -24556,7 +24556,7 @@
               <a:t>ADSI</a:t>
             </a:r>
             <a:r>
-              <a:rPr lang="es" sz="3000" b="1" i="0" u="none" strike="noStrike" cap="none">
+              <a:rPr lang="es" sz="3000" b="1" i="0" u="none" strike="noStrike" cap="none" dirty="0">
                 <a:solidFill>
                   <a:srgbClr val="31859B"/>
                 </a:solidFill>
@@ -24568,7 +24568,7 @@
               <a:t> </a:t>
             </a:r>
             <a:r>
-              <a:rPr lang="es" sz="3000" b="1">
+              <a:rPr lang="es" sz="3000" b="1" dirty="0">
                 <a:solidFill>
                   <a:srgbClr val="31859B"/>
                 </a:solidFill>
@@ -24580,7 +24580,7 @@
               <a:t>1803170</a:t>
             </a:r>
             <a:r>
-              <a:rPr lang="es" sz="3000" b="1" i="0" u="none" strike="noStrike" cap="none">
+              <a:rPr lang="es" sz="3000" b="1" i="0" u="none" strike="noStrike" cap="none" dirty="0">
                 <a:solidFill>
                   <a:srgbClr val="31859B"/>
                 </a:solidFill>
@@ -24589,19 +24589,7 @@
                 <a:cs typeface="Calibri"/>
                 <a:sym typeface="Calibri"/>
               </a:rPr>
-              <a:t> </a:t>
-            </a:r>
-            <a:r>
-              <a:rPr lang="es" sz="3000" b="1" i="0" u="none" strike="noStrike" cap="none" dirty="0">
-                <a:solidFill>
-                  <a:srgbClr val="31859B"/>
-                </a:solidFill>
-                <a:latin typeface="Calibri"/>
-                <a:ea typeface="Calibri"/>
-                <a:cs typeface="Calibri"/>
-                <a:sym typeface="Calibri"/>
-              </a:rPr>
-              <a:t>| Diurno </a:t>
+              <a:t> | Diurno </a:t>
             </a:r>
             <a:endParaRPr sz="3000" b="0" i="0" u="none" strike="noStrike" cap="none" dirty="0">
               <a:solidFill>
@@ -24739,106 +24727,6 @@
                 <a:sym typeface="Calibri"/>
               </a:rPr>
               <a:t>Febrero 2019</a:t>
-            </a:r>
-            <a:endParaRPr sz="1400" b="1" i="0" u="none" strike="noStrike" cap="none" dirty="0">
-              <a:solidFill>
-                <a:srgbClr val="999999"/>
-              </a:solidFill>
-              <a:latin typeface="Calibri"/>
-              <a:ea typeface="Calibri"/>
-              <a:cs typeface="Calibri"/>
-              <a:sym typeface="Calibri"/>
-            </a:endParaRPr>
-          </a:p>
-          <a:p>
-            <a:pPr marL="0" marR="0" lvl="0" indent="0" algn="ctr" rtl="0">
-              <a:lnSpc>
-                <a:spcPct val="107916"/>
-              </a:lnSpc>
-              <a:spcBef>
-                <a:spcPts val="800"/>
-              </a:spcBef>
-              <a:spcAft>
-                <a:spcPts val="800"/>
-              </a:spcAft>
-              <a:buClr>
-                <a:schemeClr val="dk1"/>
-              </a:buClr>
-              <a:buSzPts val="1100"/>
-              <a:buFont typeface="Arial"/>
-              <a:buNone/>
-            </a:pPr>
-            <a:r>
-              <a:rPr lang="es" b="1" dirty="0">
-                <a:solidFill>
-                  <a:srgbClr val="999999"/>
-                </a:solidFill>
-                <a:latin typeface="Calibri"/>
-                <a:ea typeface="Calibri"/>
-                <a:cs typeface="Calibri"/>
-                <a:sym typeface="Calibri"/>
-              </a:rPr>
-              <a:t>Calle 69 </a:t>
-            </a:r>
-            <a:r>
-              <a:rPr lang="es" sz="1400" b="1" i="0" u="none" strike="noStrike" cap="none" dirty="0">
-                <a:solidFill>
-                  <a:srgbClr val="999999"/>
-                </a:solidFill>
-                <a:latin typeface="Calibri"/>
-                <a:ea typeface="Calibri"/>
-                <a:cs typeface="Calibri"/>
-                <a:sym typeface="Calibri"/>
-              </a:rPr>
-              <a:t>No. </a:t>
-            </a:r>
-            <a:r>
-              <a:rPr lang="es" b="1" dirty="0">
-                <a:solidFill>
-                  <a:srgbClr val="999999"/>
-                </a:solidFill>
-                <a:latin typeface="Calibri"/>
-                <a:ea typeface="Calibri"/>
-                <a:cs typeface="Calibri"/>
-                <a:sym typeface="Calibri"/>
-              </a:rPr>
-              <a:t>20 </a:t>
-            </a:r>
-            <a:r>
-              <a:rPr lang="es" sz="1400" b="1" i="0" u="none" strike="noStrike" cap="none" dirty="0">
-                <a:solidFill>
-                  <a:srgbClr val="999999"/>
-                </a:solidFill>
-                <a:latin typeface="Calibri"/>
-                <a:ea typeface="Calibri"/>
-                <a:cs typeface="Calibri"/>
-                <a:sym typeface="Calibri"/>
-              </a:rPr>
-              <a:t>- </a:t>
-            </a:r>
-            <a:r>
-              <a:rPr lang="es" b="1" dirty="0">
-                <a:solidFill>
-                  <a:srgbClr val="999999"/>
-                </a:solidFill>
-                <a:latin typeface="Calibri"/>
-                <a:ea typeface="Calibri"/>
-                <a:cs typeface="Calibri"/>
-                <a:sym typeface="Calibri"/>
-              </a:rPr>
-              <a:t>36</a:t>
-            </a:r>
-            <a:r>
-              <a:rPr lang="es" sz="1400" b="1" i="0" u="none" strike="noStrike" cap="none" dirty="0">
-                <a:solidFill>
-                  <a:srgbClr val="999999"/>
-                </a:solidFill>
-                <a:latin typeface="Calibri"/>
-                <a:ea typeface="Calibri"/>
-                <a:cs typeface="Calibri"/>
-                <a:sym typeface="Calibri"/>
-              </a:rPr>
-              <a:t> sur, Bogotá D.C, Colombia</a:t>
             </a:r>
             <a:endParaRPr sz="1400" b="1" i="0" u="none" strike="noStrike" cap="none" dirty="0">
               <a:solidFill>
@@ -25648,7 +25536,25 @@
                 <a:cs typeface="Times New Roman"/>
                 <a:sym typeface="Times New Roman"/>
               </a:rPr>
-              <a:t>Vladimir Alberto Buitrago</a:t>
+              <a:t>Vladimir </a:t>
+            </a:r>
+            <a:r>
+              <a:rPr lang="es-CO" sz="2000" dirty="0">
+                <a:latin typeface="Times New Roman"/>
+                <a:ea typeface="Times New Roman"/>
+                <a:cs typeface="Times New Roman"/>
+                <a:sym typeface="Times New Roman"/>
+              </a:rPr>
+              <a:t>Alberto</a:t>
+            </a:r>
+            <a:r>
+              <a:rPr lang="es" sz="2000" dirty="0">
+                <a:latin typeface="Times New Roman"/>
+                <a:ea typeface="Times New Roman"/>
+                <a:cs typeface="Times New Roman"/>
+                <a:sym typeface="Times New Roman"/>
+              </a:rPr>
+              <a:t> Buitrago </a:t>
             </a:r>
             <a:endParaRPr sz="2000" dirty="0">
               <a:latin typeface="Times New Roman"/>
@@ -25661,10 +25567,10 @@
       </p:sp>
       <p:pic>
         <p:nvPicPr>
-          <p:cNvPr id="5" name="Imagen 4">
+          <p:cNvPr id="4" name="Imagen 3">
             <a:extLst>
               <a:ext uri="{FF2B5EF4-FFF2-40B4-BE49-F238E27FC236}">
-                <a16:creationId xmlns:a16="http://schemas.microsoft.com/office/drawing/2014/main" id="{8D3E4F7D-C92E-4BC9-AE6D-2605846E0673}"/>
+                <a16:creationId xmlns:a16="http://schemas.microsoft.com/office/drawing/2014/main" id="{D554E87D-54C2-4FE3-A18B-79F7375DC92B}"/>
               </a:ext>
             </a:extLst>
           </p:cNvPr>
@@ -25681,8 +25587,8 @@
         </p:blipFill>
         <p:spPr>
           <a:xfrm>
-            <a:off x="5938684" y="2689737"/>
-            <a:ext cx="1573161" cy="1573161"/>
+            <a:off x="5918449" y="2571750"/>
+            <a:ext cx="1556239" cy="1556239"/>
           </a:xfrm>
           <a:prstGeom prst="rect">
             <a:avLst/>
@@ -25886,7 +25792,7 @@
                 <a:cs typeface="Times New Roman"/>
                 <a:sym typeface="Times New Roman"/>
               </a:rPr>
-              <a:t>Diseñar un aplicativo web para solucionar problemas de comunicación en la tienda de videojuegos.</a:t>
+              <a:t>Diseñar un aplicativo web para solucionar los problemas de comunicación en la tienda de videojuegos del barrio Diana Turbay.</a:t>
             </a:r>
             <a:endParaRPr sz="2000" dirty="0">
               <a:latin typeface="Georgia"/>
@@ -26138,57 +26044,6 @@
               </a:rPr>
               <a:t>Promocionar los productos disponibles en el local desde el aplicativo web.</a:t>
             </a:r>
-            <a:endParaRPr sz="2000" dirty="0">
-              <a:latin typeface="Times New Roman"/>
-              <a:ea typeface="Times New Roman"/>
-              <a:cs typeface="Times New Roman"/>
-              <a:sym typeface="Times New Roman"/>
-            </a:endParaRPr>
-          </a:p>
-          <a:p>
-            <a:pPr marL="457200" lvl="0" indent="-342900" algn="just" rtl="0">
-              <a:lnSpc>
-                <a:spcPct val="115000"/>
-              </a:lnSpc>
-              <a:spcBef>
-                <a:spcPts val="0"/>
-              </a:spcBef>
-              <a:spcAft>
-                <a:spcPts val="0"/>
-              </a:spcAft>
-              <a:buSzPts val="1800"/>
-              <a:buFont typeface="Times New Roman"/>
-              <a:buAutoNum type="arabicPeriod"/>
-            </a:pPr>
-            <a:r>
-              <a:rPr lang="es" sz="2000" dirty="0">
-                <a:latin typeface="Times New Roman"/>
-                <a:ea typeface="Times New Roman"/>
-                <a:cs typeface="Times New Roman"/>
-                <a:sym typeface="Times New Roman"/>
-              </a:rPr>
-              <a:t>Calcular las ganancias obtenidas en el dia y generar un reporte. </a:t>
-            </a:r>
-            <a:endParaRPr sz="2000" dirty="0">
-              <a:latin typeface="Times New Roman"/>
-              <a:ea typeface="Times New Roman"/>
-              <a:cs typeface="Times New Roman"/>
-              <a:sym typeface="Times New Roman"/>
-            </a:endParaRPr>
-          </a:p>
-          <a:p>
-            <a:pPr marL="457200" lvl="0" indent="0" algn="just" rtl="0">
-              <a:lnSpc>
-                <a:spcPct val="115000"/>
-              </a:lnSpc>
-              <a:spcBef>
-                <a:spcPts val="0"/>
-              </a:spcBef>
-              <a:spcAft>
-                <a:spcPts val="0"/>
-              </a:spcAft>
-              <a:buNone/>
-            </a:pPr>
             <a:endParaRPr sz="1800" dirty="0">
               <a:latin typeface="Times New Roman"/>
               <a:ea typeface="Times New Roman"/>
@@ -26402,16 +26257,16 @@
                 <a:cs typeface="Times New Roman"/>
                 <a:sym typeface="Times New Roman"/>
               </a:rPr>
-              <a:t>La tienda de videojuegos ofrece servicios de xbox, internet, productos alimenticios, fotocopias. El lugar no cuenta con ningún tipo de publicidad lo que hace que no sea tan notable para las personas interesadas y, tras llevar una contabilidad en una hoja manual, le ha causado problemas en cuanto a ganancias y pérdidas del dia </a:t>
+              <a:t>La tienda de videojuegos ofrece servicios de xbox, internet, productos alimenticios, fotocopias. El lugar no cuenta con ningún tipo de publicidad, tras llevar una contabilidad en una hoja manual, le ha causado problemas en cuanto a ganancias y pérdidas del dia,</a:t>
             </a:r>
             <a:r>
-              <a:rPr lang="es-MX" sz="2000" dirty="0">
+              <a:rPr lang="es-CO" sz="2000" dirty="0">
                 <a:latin typeface="Times New Roman"/>
                 <a:ea typeface="Times New Roman"/>
                 <a:cs typeface="Times New Roman"/>
                 <a:sym typeface="Times New Roman"/>
               </a:rPr>
-              <a:t>porque </a:t>
+              <a:t> </a:t>
             </a:r>
             <a:r>
               <a:rPr lang="es" sz="2000" dirty="0">
@@ -26420,7 +26275,7 @@
                 <a:cs typeface="Times New Roman"/>
                 <a:sym typeface="Times New Roman"/>
               </a:rPr>
-              <a:t>la hoja podria perderse y ocasionar problemas. Los clientes no saben exactamente los horarios de atención del local de videojuegos y no cuenta con un aplicativo web que le facilite el ingreso de datos de forma adecuada y eficiente. </a:t>
+              <a:t>la hoja podria perderse y ocasionar problemas. Los clientes no saben exactamente los horarios de atención del local de videojuegos.</a:t>
             </a:r>
             <a:endParaRPr sz="2000" dirty="0">
               <a:latin typeface="Times New Roman"/>
@@ -26641,7 +26496,25 @@
                 <a:cs typeface="Times New Roman"/>
                 <a:sym typeface="Times New Roman"/>
               </a:rPr>
-              <a:t>El proyecto va dirigido para la tienda de videojuegos ubicada en el barrio Diana Turbay Cra 2b Cll 47 - 37 Sur, con el cual queremos lograr un inventario de ventas e ingreso de clientes para llevar un control diario, que facilitaria el manejo economico de la tienda de videojuegos cuando el usuario quiera adquirir un producto o servicio solo sea necesario ingresar al aplicativo web y adquirir el producto o servicio que desee no sin antes verificar el horario disponible.</a:t>
+              <a:t>El proyecto va dirigido para la tienda de videojuegos ubicada en el barrio Diana Turbay Cra 2b Cll 47 - 37 Sur, con el cual queremos </a:t>
+            </a:r>
+            <a:r>
+              <a:rPr lang="es-CO" sz="2000" dirty="0">
+                <a:latin typeface="Times New Roman"/>
+                <a:ea typeface="Times New Roman"/>
+                <a:cs typeface="Times New Roman"/>
+                <a:sym typeface="Times New Roman"/>
+              </a:rPr>
+              <a:t>facilitar</a:t>
+            </a:r>
+            <a:r>
+              <a:rPr lang="es" sz="2000" dirty="0">
+                <a:latin typeface="Times New Roman"/>
+                <a:ea typeface="Times New Roman"/>
+                <a:cs typeface="Times New Roman"/>
+                <a:sym typeface="Times New Roman"/>
+              </a:rPr>
+              <a:t> el manejo economico de la tienda de videojuegos cuando el usuario quiera adquirir un producto o servicio solo sea necesario ingresar al aplicativo web y adquirir el producto o servicio que desee no sin antes verificar el horario disponible.</a:t>
             </a:r>
             <a:endParaRPr sz="2000" dirty="0">
               <a:latin typeface="Times New Roman"/>
@@ -26829,7 +26702,7 @@
                 <a:cs typeface="Times New Roman"/>
                 <a:sym typeface="Times New Roman"/>
               </a:rPr>
-              <a:t>La presente información se enfocará en analizar, investigar, solucionar el problema de publicidad en el local de videojuegos </a:t>
+              <a:t>La presente información se enfocará en solucionar el problema de publicidad en el local de videojuegos </a:t>
             </a:r>
             <a:r>
               <a:rPr lang="es" sz="2000" b="1" dirty="0">
@@ -26883,16 +26756,16 @@
                 <a:cs typeface="Times New Roman"/>
                 <a:sym typeface="Times New Roman"/>
               </a:rPr>
-              <a:t>, el cual, ayudará a mejorar las ventas, ya que se han visto bastante afectadas al no ser tan reconocida debido a su mala ubicación </a:t>
+              <a:t>, el cual, ayudará a mejorar las ventas</a:t>
             </a:r>
             <a:r>
-              <a:rPr lang="es" sz="2000" b="1" dirty="0">
+              <a:rPr lang="es" sz="2000">
                 <a:latin typeface="Times New Roman"/>
                 <a:ea typeface="Times New Roman"/>
                 <a:cs typeface="Times New Roman"/>
                 <a:sym typeface="Times New Roman"/>
               </a:rPr>
-              <a:t>(</a:t>
+              <a:t>, por </a:t>
             </a:r>
             <a:r>
               <a:rPr lang="es" sz="2000" dirty="0">
@@ -26901,59 +26774,7 @@
                 <a:cs typeface="Times New Roman"/>
                 <a:sym typeface="Times New Roman"/>
               </a:rPr>
-              <a:t>en un lugar no muy visible para los clientes</a:t>
-            </a:r>
-            <a:r>
-              <a:rPr lang="es" sz="2000" b="1" dirty="0">
-                <a:latin typeface="Times New Roman"/>
-                <a:ea typeface="Times New Roman"/>
-                <a:cs typeface="Times New Roman"/>
-                <a:sym typeface="Times New Roman"/>
-              </a:rPr>
-              <a:t>)</a:t>
-            </a:r>
-            <a:r>
-              <a:rPr lang="es" sz="2000" dirty="0">
-                <a:latin typeface="Times New Roman"/>
-                <a:ea typeface="Times New Roman"/>
-                <a:cs typeface="Times New Roman"/>
-                <a:sym typeface="Times New Roman"/>
-              </a:rPr>
-              <a:t> y la deficiente administración del mismo.</a:t>
-            </a:r>
-            <a:endParaRPr sz="2000" dirty="0">
-              <a:latin typeface="Times New Roman"/>
-              <a:ea typeface="Times New Roman"/>
-              <a:cs typeface="Times New Roman"/>
-              <a:sym typeface="Times New Roman"/>
-            </a:endParaRPr>
-          </a:p>
-          <a:p>
-            <a:pPr marL="0" lvl="0" indent="0" algn="just" rtl="0">
-              <a:lnSpc>
-                <a:spcPct val="115000"/>
-              </a:lnSpc>
-              <a:spcBef>
-                <a:spcPts val="0"/>
-              </a:spcBef>
-              <a:spcAft>
-                <a:spcPts val="0"/>
-              </a:spcAft>
-              <a:buClr>
-                <a:schemeClr val="dk1"/>
-              </a:buClr>
-              <a:buSzPts val="1100"/>
-              <a:buFont typeface="Arial"/>
-              <a:buNone/>
-            </a:pPr>
-            <a:r>
-              <a:rPr lang="es" sz="2000" dirty="0">
-                <a:latin typeface="Times New Roman"/>
-                <a:ea typeface="Times New Roman"/>
-                <a:cs typeface="Times New Roman"/>
-                <a:sym typeface="Times New Roman"/>
-              </a:rPr>
-              <a:t>Por consiguiente el proyecto aquí presentado dará como resultado una solución práctica a todos estos inconvenientes. </a:t>
+              <a:t>consiguiente el proyecto aquí presentado dará como resultado una solución práctica a todos estos inconvenientes. </a:t>
             </a:r>
             <a:endParaRPr sz="2000" dirty="0">
               <a:latin typeface="Times New Roman"/>

</xml_diff>